<commit_message>
Edit the final slide.
</commit_message>
<xml_diff>
--- a/FinalReport_team1.pptx
+++ b/FinalReport_team1.pptx
@@ -228,9 +228,9 @@
 <file path=ppt/comments/comment5.xml><?xml version="1.0" encoding="utf-8"?>
 <p:cmLst xmlns:a="http://schemas.openxmlformats.org/drawingml/2006/main" xmlns:r="http://schemas.openxmlformats.org/officeDocument/2006/relationships" xmlns:p="http://schemas.openxmlformats.org/presentationml/2006/main">
   <p:cm authorId="6" dt="2017-02-02T09:40:50.200" idx="1">
-    <p:pos x="3132" y="862"/>
+    <p:pos x="828" y="588"/>
     <p:text>成果物の公開を担当される方は記入してね！</p:text>
-    <p:extLst>
+    <p:extLst mod="1">
       <p:ext uri="{C676402C-5697-4E1C-873F-D02D1690AC5C}">
         <p15:threadingInfo xmlns:p15="http://schemas.microsoft.com/office/powerpoint/2012/main" timeZoneBias="-540"/>
       </p:ext>
@@ -5391,7 +5391,7 @@
           </a:p>
           <a:p>
             <a:pPr lvl="1" algn="just"/>
-            <a:endParaRPr lang="en-US" altLang="ja-JP" sz="1600" kern="100" dirty="0" smtClean="0">
+            <a:endParaRPr lang="en-US" altLang="ja-JP" sz="1600" kern="100" dirty="0">
               <a:latin typeface="HGPGothicE" charset="-128"/>
               <a:ea typeface="Yu Mincho" charset="-128"/>
               <a:cs typeface="Times New Roman" charset="0"/>
@@ -5416,10 +5416,7 @@
             </a:endParaRPr>
           </a:p>
           <a:p>
-            <a:pPr marL="342900" lvl="0" indent="-342900" algn="just">
-              <a:spcAft>
-                <a:spcPts val="0"/>
-              </a:spcAft>
+            <a:pPr marL="1257300" lvl="2" indent="-342900" algn="just">
               <a:buFont typeface="HGPGothicE" charset="-128"/>
               <a:buChar char="・"/>
             </a:pPr>
@@ -5640,14 +5637,14 @@
           <p:nvPr>
             <p:extLst>
               <p:ext uri="{D42A27DB-BD31-4B8C-83A1-F6EECF244321}">
-                <p14:modId xmlns:p14="http://schemas.microsoft.com/office/powerpoint/2010/main" val="3090338536"/>
+                <p14:modId xmlns:p14="http://schemas.microsoft.com/office/powerpoint/2010/main" val="627280437"/>
               </p:ext>
             </p:extLst>
           </p:nvPr>
         </p:nvGraphicFramePr>
         <p:xfrm>
-          <a:off x="5216780" y="823109"/>
-          <a:ext cx="6358127" cy="5709238"/>
+          <a:off x="5186796" y="1272302"/>
+          <a:ext cx="6358127" cy="5449173"/>
         </p:xfrm>
         <a:graphic>
           <a:graphicData uri="http://schemas.openxmlformats.org/drawingml/2006/table">
@@ -5659,14 +5656,14 @@
                 <a:gridCol w="2373131">
                   <a:extLst>
                     <a:ext uri="{9D8B030D-6E8A-4147-A177-3AD203B41FA5}">
-                      <a16:colId xmlns:a16="http://schemas.microsoft.com/office/drawing/2014/main" val="20000"/>
+                      <a16:colId xmlns:a16="http://schemas.microsoft.com/office/drawing/2014/main" xmlns="" val="20000"/>
                     </a:ext>
                   </a:extLst>
                 </a:gridCol>
                 <a:gridCol w="3984996">
                   <a:extLst>
                     <a:ext uri="{9D8B030D-6E8A-4147-A177-3AD203B41FA5}">
-                      <a16:colId xmlns:a16="http://schemas.microsoft.com/office/drawing/2014/main" val="20001"/>
+                      <a16:colId xmlns:a16="http://schemas.microsoft.com/office/drawing/2014/main" xmlns="" val="20001"/>
                     </a:ext>
                   </a:extLst>
                 </a:gridCol>
@@ -5726,7 +5723,7 @@
                 </a:tc>
                 <a:extLst>
                   <a:ext uri="{0D108BD9-81ED-4DB2-BD59-A6C34878D82A}">
-                    <a16:rowId xmlns:a16="http://schemas.microsoft.com/office/drawing/2014/main" val="10000"/>
+                    <a16:rowId xmlns:a16="http://schemas.microsoft.com/office/drawing/2014/main" xmlns="" val="10000"/>
                   </a:ext>
                 </a:extLst>
               </a:tr>
@@ -5803,7 +5800,7 @@
                 </a:tc>
                 <a:extLst>
                   <a:ext uri="{0D108BD9-81ED-4DB2-BD59-A6C34878D82A}">
-                    <a16:rowId xmlns:a16="http://schemas.microsoft.com/office/drawing/2014/main" val="10001"/>
+                    <a16:rowId xmlns:a16="http://schemas.microsoft.com/office/drawing/2014/main" xmlns="" val="10001"/>
                   </a:ext>
                 </a:extLst>
               </a:tr>
@@ -5896,72 +5893,7 @@
                 </a:tc>
                 <a:extLst>
                   <a:ext uri="{0D108BD9-81ED-4DB2-BD59-A6C34878D82A}">
-                    <a16:rowId xmlns:a16="http://schemas.microsoft.com/office/drawing/2014/main" val="10002"/>
-                  </a:ext>
-                </a:extLst>
-              </a:tr>
-              <a:tr h="260065">
-                <a:tc>
-                  <a:txBody>
-                    <a:bodyPr/>
-                    <a:lstStyle/>
-                    <a:p>
-                      <a:pPr algn="ctr">
-                        <a:spcAft>
-                          <a:spcPts val="0"/>
-                        </a:spcAft>
-                      </a:pPr>
-                      <a:r>
-                        <a:rPr lang="en-US" sz="1200" kern="100" dirty="0">
-                          <a:effectLst/>
-                        </a:rPr>
-                        <a:t> </a:t>
-                      </a:r>
-                      <a:endParaRPr lang="ja-JP" sz="1200" kern="100" dirty="0">
-                        <a:effectLst/>
-                        <a:latin typeface="Yu Mincho" charset="-128"/>
-                        <a:ea typeface="Yu Mincho" charset="-128"/>
-                        <a:cs typeface="Times New Roman" charset="0"/>
-                      </a:endParaRPr>
-                    </a:p>
-                  </a:txBody>
-                  <a:tcPr marL="58111" marR="58111" marT="0" marB="0" anchor="ctr"/>
-                </a:tc>
-                <a:tc>
-                  <a:txBody>
-                    <a:bodyPr/>
-                    <a:lstStyle/>
-                    <a:p>
-                      <a:pPr algn="just">
-                        <a:spcAft>
-                          <a:spcPts val="0"/>
-                        </a:spcAft>
-                      </a:pPr>
-                      <a:r>
-                        <a:rPr lang="en-US" sz="1200" kern="100" dirty="0">
-                          <a:effectLst/>
-                        </a:rPr>
-                        <a:t> </a:t>
-                      </a:r>
-                      <a:r>
-                        <a:rPr lang="ja-JP" altLang="en-US" sz="1200" kern="100" dirty="0" smtClean="0">
-                          <a:effectLst/>
-                        </a:rPr>
-                        <a:t>（冬休み中、各自で課題に取り組む）</a:t>
-                      </a:r>
-                      <a:endParaRPr lang="ja-JP" sz="1200" kern="100" dirty="0">
-                        <a:effectLst/>
-                        <a:latin typeface="Yu Mincho" charset="-128"/>
-                        <a:ea typeface="Yu Mincho" charset="-128"/>
-                        <a:cs typeface="Times New Roman" charset="0"/>
-                      </a:endParaRPr>
-                    </a:p>
-                  </a:txBody>
-                  <a:tcPr marL="58111" marR="58111" marT="0" marB="0" anchor="ctr"/>
-                </a:tc>
-                <a:extLst>
-                  <a:ext uri="{0D108BD9-81ED-4DB2-BD59-A6C34878D82A}">
-                    <a16:rowId xmlns:a16="http://schemas.microsoft.com/office/drawing/2014/main" val="10003"/>
+                    <a16:rowId xmlns:a16="http://schemas.microsoft.com/office/drawing/2014/main" xmlns="" val="10002"/>
                   </a:ext>
                 </a:extLst>
               </a:tr>
@@ -5977,12 +5909,12 @@
                         </a:spcAft>
                       </a:pPr>
                       <a:r>
-                        <a:rPr lang="en-US" sz="1200" kern="100">
+                        <a:rPr lang="en-US" sz="1200" kern="100" dirty="0">
                           <a:effectLst/>
                         </a:rPr>
                         <a:t>1/11 (Wed.) 10:30 – 14:30</a:t>
                       </a:r>
-                      <a:endParaRPr lang="ja-JP" sz="1200" kern="100">
+                      <a:endParaRPr lang="ja-JP" sz="1200" kern="100" dirty="0">
                         <a:effectLst/>
                         <a:latin typeface="Yu Mincho" charset="-128"/>
                         <a:ea typeface="Yu Mincho" charset="-128"/>
@@ -6044,7 +5976,7 @@
                 </a:tc>
                 <a:extLst>
                   <a:ext uri="{0D108BD9-81ED-4DB2-BD59-A6C34878D82A}">
-                    <a16:rowId xmlns:a16="http://schemas.microsoft.com/office/drawing/2014/main" val="10004"/>
+                    <a16:rowId xmlns:a16="http://schemas.microsoft.com/office/drawing/2014/main" xmlns="" val="10004"/>
                   </a:ext>
                 </a:extLst>
               </a:tr>
@@ -6139,7 +6071,7 @@
                 </a:tc>
                 <a:extLst>
                   <a:ext uri="{0D108BD9-81ED-4DB2-BD59-A6C34878D82A}">
-                    <a16:rowId xmlns:a16="http://schemas.microsoft.com/office/drawing/2014/main" val="10005"/>
+                    <a16:rowId xmlns:a16="http://schemas.microsoft.com/office/drawing/2014/main" xmlns="" val="10005"/>
                   </a:ext>
                 </a:extLst>
               </a:tr>
@@ -6228,7 +6160,7 @@
                 </a:tc>
                 <a:extLst>
                   <a:ext uri="{0D108BD9-81ED-4DB2-BD59-A6C34878D82A}">
-                    <a16:rowId xmlns:a16="http://schemas.microsoft.com/office/drawing/2014/main" val="10006"/>
+                    <a16:rowId xmlns:a16="http://schemas.microsoft.com/office/drawing/2014/main" xmlns="" val="10006"/>
                   </a:ext>
                 </a:extLst>
               </a:tr>
@@ -6311,7 +6243,7 @@
                 </a:tc>
                 <a:extLst>
                   <a:ext uri="{0D108BD9-81ED-4DB2-BD59-A6C34878D82A}">
-                    <a16:rowId xmlns:a16="http://schemas.microsoft.com/office/drawing/2014/main" val="10007"/>
+                    <a16:rowId xmlns:a16="http://schemas.microsoft.com/office/drawing/2014/main" xmlns="" val="10007"/>
                   </a:ext>
                 </a:extLst>
               </a:tr>
@@ -6394,7 +6326,7 @@
                 </a:tc>
                 <a:extLst>
                   <a:ext uri="{0D108BD9-81ED-4DB2-BD59-A6C34878D82A}">
-                    <a16:rowId xmlns:a16="http://schemas.microsoft.com/office/drawing/2014/main" val="10008"/>
+                    <a16:rowId xmlns:a16="http://schemas.microsoft.com/office/drawing/2014/main" xmlns="" val="10008"/>
                   </a:ext>
                 </a:extLst>
               </a:tr>
@@ -6477,7 +6409,7 @@
                 </a:tc>
                 <a:extLst>
                   <a:ext uri="{0D108BD9-81ED-4DB2-BD59-A6C34878D82A}">
-                    <a16:rowId xmlns:a16="http://schemas.microsoft.com/office/drawing/2014/main" val="10009"/>
+                    <a16:rowId xmlns:a16="http://schemas.microsoft.com/office/drawing/2014/main" xmlns="" val="10009"/>
                   </a:ext>
                 </a:extLst>
               </a:tr>
@@ -6548,7 +6480,7 @@
                 </a:tc>
                 <a:extLst>
                   <a:ext uri="{0D108BD9-81ED-4DB2-BD59-A6C34878D82A}">
-                    <a16:rowId xmlns:a16="http://schemas.microsoft.com/office/drawing/2014/main" val="10010"/>
+                    <a16:rowId xmlns:a16="http://schemas.microsoft.com/office/drawing/2014/main" xmlns="" val="10010"/>
                   </a:ext>
                 </a:extLst>
               </a:tr>
@@ -6607,7 +6539,7 @@
                 </a:tc>
                 <a:extLst>
                   <a:ext uri="{0D108BD9-81ED-4DB2-BD59-A6C34878D82A}">
-                    <a16:rowId xmlns:a16="http://schemas.microsoft.com/office/drawing/2014/main" val="10011"/>
+                    <a16:rowId xmlns:a16="http://schemas.microsoft.com/office/drawing/2014/main" xmlns="" val="10011"/>
                   </a:ext>
                 </a:extLst>
               </a:tr>
@@ -6696,7 +6628,7 @@
                 </a:tc>
                 <a:extLst>
                   <a:ext uri="{0D108BD9-81ED-4DB2-BD59-A6C34878D82A}">
-                    <a16:rowId xmlns:a16="http://schemas.microsoft.com/office/drawing/2014/main" val="10012"/>
+                    <a16:rowId xmlns:a16="http://schemas.microsoft.com/office/drawing/2014/main" xmlns="" val="10012"/>
                   </a:ext>
                 </a:extLst>
               </a:tr>
@@ -6767,7 +6699,7 @@
                 </a:tc>
                 <a:extLst>
                   <a:ext uri="{0D108BD9-81ED-4DB2-BD59-A6C34878D82A}">
-                    <a16:rowId xmlns:a16="http://schemas.microsoft.com/office/drawing/2014/main" val="10013"/>
+                    <a16:rowId xmlns:a16="http://schemas.microsoft.com/office/drawing/2014/main" xmlns="" val="10013"/>
                   </a:ext>
                 </a:extLst>
               </a:tr>
@@ -6862,7 +6794,7 @@
                 </a:tc>
                 <a:extLst>
                   <a:ext uri="{0D108BD9-81ED-4DB2-BD59-A6C34878D82A}">
-                    <a16:rowId xmlns:a16="http://schemas.microsoft.com/office/drawing/2014/main" val="10014"/>
+                    <a16:rowId xmlns:a16="http://schemas.microsoft.com/office/drawing/2014/main" xmlns="" val="10014"/>
                   </a:ext>
                 </a:extLst>
               </a:tr>
@@ -6933,7 +6865,7 @@
                 </a:tc>
                 <a:extLst>
                   <a:ext uri="{0D108BD9-81ED-4DB2-BD59-A6C34878D82A}">
-                    <a16:rowId xmlns:a16="http://schemas.microsoft.com/office/drawing/2014/main" val="10015"/>
+                    <a16:rowId xmlns:a16="http://schemas.microsoft.com/office/drawing/2014/main" xmlns="" val="10015"/>
                   </a:ext>
                 </a:extLst>
               </a:tr>
@@ -7014,7 +6946,7 @@
                 </a:tc>
                 <a:extLst>
                   <a:ext uri="{0D108BD9-81ED-4DB2-BD59-A6C34878D82A}">
-                    <a16:rowId xmlns:a16="http://schemas.microsoft.com/office/drawing/2014/main" val="10016"/>
+                    <a16:rowId xmlns:a16="http://schemas.microsoft.com/office/drawing/2014/main" xmlns="" val="10016"/>
                   </a:ext>
                 </a:extLst>
               </a:tr>
@@ -7097,7 +7029,7 @@
                 </a:tc>
                 <a:extLst>
                   <a:ext uri="{0D108BD9-81ED-4DB2-BD59-A6C34878D82A}">
-                    <a16:rowId xmlns:a16="http://schemas.microsoft.com/office/drawing/2014/main" val="10017"/>
+                    <a16:rowId xmlns:a16="http://schemas.microsoft.com/office/drawing/2014/main" xmlns="" val="10017"/>
                   </a:ext>
                 </a:extLst>
               </a:tr>
@@ -7180,7 +7112,7 @@
                 </a:tc>
                 <a:extLst>
                   <a:ext uri="{0D108BD9-81ED-4DB2-BD59-A6C34878D82A}">
-                    <a16:rowId xmlns:a16="http://schemas.microsoft.com/office/drawing/2014/main" val="10018"/>
+                    <a16:rowId xmlns:a16="http://schemas.microsoft.com/office/drawing/2014/main" xmlns="" val="10018"/>
                   </a:ext>
                 </a:extLst>
               </a:tr>
@@ -7251,7 +7183,7 @@
                 </a:tc>
                 <a:extLst>
                   <a:ext uri="{0D108BD9-81ED-4DB2-BD59-A6C34878D82A}">
-                    <a16:rowId xmlns:a16="http://schemas.microsoft.com/office/drawing/2014/main" val="10019"/>
+                    <a16:rowId xmlns:a16="http://schemas.microsoft.com/office/drawing/2014/main" xmlns="" val="10019"/>
                   </a:ext>
                 </a:extLst>
               </a:tr>
@@ -7267,7 +7199,7 @@
         </p:nvSpPr>
         <p:spPr>
           <a:xfrm>
-            <a:off x="8867007" y="410779"/>
+            <a:off x="6901355" y="902970"/>
             <a:ext cx="2929007" cy="369332"/>
           </a:xfrm>
           <a:prstGeom prst="rect">
@@ -7447,14 +7379,14 @@
                 <a:gridCol w="2054453">
                   <a:extLst>
                     <a:ext uri="{9D8B030D-6E8A-4147-A177-3AD203B41FA5}">
-                      <a16:colId xmlns:a16="http://schemas.microsoft.com/office/drawing/2014/main" val="20000"/>
+                      <a16:colId xmlns:a16="http://schemas.microsoft.com/office/drawing/2014/main" xmlns="" val="20000"/>
                     </a:ext>
                   </a:extLst>
                 </a:gridCol>
                 <a:gridCol w="4868409">
                   <a:extLst>
                     <a:ext uri="{9D8B030D-6E8A-4147-A177-3AD203B41FA5}">
-                      <a16:colId xmlns:a16="http://schemas.microsoft.com/office/drawing/2014/main" val="20001"/>
+                      <a16:colId xmlns:a16="http://schemas.microsoft.com/office/drawing/2014/main" xmlns="" val="20001"/>
                     </a:ext>
                   </a:extLst>
                 </a:gridCol>
@@ -7514,7 +7446,7 @@
                 </a:tc>
                 <a:extLst>
                   <a:ext uri="{0D108BD9-81ED-4DB2-BD59-A6C34878D82A}">
-                    <a16:rowId xmlns:a16="http://schemas.microsoft.com/office/drawing/2014/main" val="10000"/>
+                    <a16:rowId xmlns:a16="http://schemas.microsoft.com/office/drawing/2014/main" xmlns="" val="10000"/>
                   </a:ext>
                 </a:extLst>
               </a:tr>
@@ -7668,7 +7600,7 @@
                 </a:tc>
                 <a:extLst>
                   <a:ext uri="{0D108BD9-81ED-4DB2-BD59-A6C34878D82A}">
-                    <a16:rowId xmlns:a16="http://schemas.microsoft.com/office/drawing/2014/main" val="10001"/>
+                    <a16:rowId xmlns:a16="http://schemas.microsoft.com/office/drawing/2014/main" xmlns="" val="10001"/>
                   </a:ext>
                 </a:extLst>
               </a:tr>
@@ -7834,7 +7766,7 @@
                 </a:tc>
                 <a:extLst>
                   <a:ext uri="{0D108BD9-81ED-4DB2-BD59-A6C34878D82A}">
-                    <a16:rowId xmlns:a16="http://schemas.microsoft.com/office/drawing/2014/main" val="10002"/>
+                    <a16:rowId xmlns:a16="http://schemas.microsoft.com/office/drawing/2014/main" xmlns="" val="10002"/>
                   </a:ext>
                 </a:extLst>
               </a:tr>
@@ -7973,7 +7905,7 @@
                 </a:tc>
                 <a:extLst>
                   <a:ext uri="{0D108BD9-81ED-4DB2-BD59-A6C34878D82A}">
-                    <a16:rowId xmlns:a16="http://schemas.microsoft.com/office/drawing/2014/main" val="10003"/>
+                    <a16:rowId xmlns:a16="http://schemas.microsoft.com/office/drawing/2014/main" xmlns="" val="10003"/>
                   </a:ext>
                 </a:extLst>
               </a:tr>
@@ -8058,7 +7990,7 @@
                 </a:tc>
                 <a:extLst>
                   <a:ext uri="{0D108BD9-81ED-4DB2-BD59-A6C34878D82A}">
-                    <a16:rowId xmlns:a16="http://schemas.microsoft.com/office/drawing/2014/main" val="10004"/>
+                    <a16:rowId xmlns:a16="http://schemas.microsoft.com/office/drawing/2014/main" xmlns="" val="10004"/>
                   </a:ext>
                 </a:extLst>
               </a:tr>
@@ -8200,7 +8132,7 @@
                 </a:tc>
                 <a:extLst>
                   <a:ext uri="{0D108BD9-81ED-4DB2-BD59-A6C34878D82A}">
-                    <a16:rowId xmlns:a16="http://schemas.microsoft.com/office/drawing/2014/main" val="10005"/>
+                    <a16:rowId xmlns:a16="http://schemas.microsoft.com/office/drawing/2014/main" xmlns="" val="10005"/>
                   </a:ext>
                 </a:extLst>
               </a:tr>
@@ -8401,6 +8333,436 @@
               <a:t>成果物の公開場所</a:t>
             </a:r>
             <a:endParaRPr lang="ja-JP" altLang="en-US" sz="4800" dirty="0"/>
+          </a:p>
+        </p:txBody>
+      </p:sp>
+      <p:sp>
+        <p:nvSpPr>
+          <p:cNvPr id="5" name="正方形/長方形 4"/>
+          <p:cNvSpPr/>
+          <p:nvPr/>
+        </p:nvSpPr>
+        <p:spPr>
+          <a:xfrm>
+            <a:off x="637350" y="1314808"/>
+            <a:ext cx="6013185" cy="369332"/>
+          </a:xfrm>
+          <a:prstGeom prst="rect">
+            <a:avLst/>
+          </a:prstGeom>
+        </p:spPr>
+        <p:txBody>
+          <a:bodyPr wrap="none">
+            <a:spAutoFit/>
+          </a:bodyPr>
+          <a:lstStyle/>
+          <a:p>
+            <a:pPr marL="285750" indent="-285750">
+              <a:buFont typeface="Arial" charset="0"/>
+              <a:buChar char="•"/>
+            </a:pPr>
+            <a:r>
+              <a:rPr lang="ja-JP" altLang="en-US" dirty="0" smtClean="0">
+                <a:latin typeface="HGGothicE" charset="-128"/>
+                <a:ea typeface="HGGothicE" charset="-128"/>
+                <a:cs typeface="HGGothicE" charset="-128"/>
+              </a:rPr>
+              <a:t>成果物の公開場所およびその説明を表６にまとめる．</a:t>
+            </a:r>
+            <a:endParaRPr lang="en-US" altLang="ja-JP" dirty="0">
+              <a:latin typeface="HGGothicE" charset="-128"/>
+              <a:ea typeface="HGGothicE" charset="-128"/>
+              <a:cs typeface="HGGothicE" charset="-128"/>
+            </a:endParaRPr>
+          </a:p>
+        </p:txBody>
+      </p:sp>
+      <p:graphicFrame>
+        <p:nvGraphicFramePr>
+          <p:cNvPr id="6" name="表 5"/>
+          <p:cNvGraphicFramePr>
+            <a:graphicFrameLocks noGrp="1"/>
+          </p:cNvGraphicFramePr>
+          <p:nvPr>
+            <p:extLst>
+              <p:ext uri="{D42A27DB-BD31-4B8C-83A1-F6EECF244321}">
+                <p14:modId xmlns:p14="http://schemas.microsoft.com/office/powerpoint/2010/main" val="1659347555"/>
+              </p:ext>
+            </p:extLst>
+          </p:nvPr>
+        </p:nvGraphicFramePr>
+        <p:xfrm>
+          <a:off x="2393792" y="2413873"/>
+          <a:ext cx="7404415" cy="2221988"/>
+        </p:xfrm>
+        <a:graphic>
+          <a:graphicData uri="http://schemas.openxmlformats.org/drawingml/2006/table">
+            <a:tbl>
+              <a:tblPr firstRow="1" firstCol="1" bandRow="1">
+                <a:tableStyleId>{5C22544A-7EE6-4342-B048-85BDC9FD1C3A}</a:tableStyleId>
+              </a:tblPr>
+              <a:tblGrid>
+                <a:gridCol w="1698873">
+                  <a:extLst>
+                    <a:ext uri="{9D8B030D-6E8A-4147-A177-3AD203B41FA5}">
+                      <a16:colId xmlns:a16="http://schemas.microsoft.com/office/drawing/2014/main" xmlns="" val="20000"/>
+                    </a:ext>
+                  </a:extLst>
+                </a:gridCol>
+                <a:gridCol w="2852771">
+                  <a:extLst>
+                    <a:ext uri="{9D8B030D-6E8A-4147-A177-3AD203B41FA5}">
+                      <a16:colId xmlns:a16="http://schemas.microsoft.com/office/drawing/2014/main" xmlns="" val="20001"/>
+                    </a:ext>
+                  </a:extLst>
+                </a:gridCol>
+                <a:gridCol w="2852771"/>
+              </a:tblGrid>
+              <a:tr h="758948">
+                <a:tc>
+                  <a:txBody>
+                    <a:bodyPr/>
+                    <a:lstStyle/>
+                    <a:p>
+                      <a:pPr algn="ctr">
+                        <a:spcAft>
+                          <a:spcPts val="0"/>
+                        </a:spcAft>
+                      </a:pPr>
+                      <a:r>
+                        <a:rPr lang="ja-JP" altLang="en-US" sz="1600" kern="100" dirty="0" smtClean="0">
+                          <a:effectLst/>
+                          <a:latin typeface="+mn-lt"/>
+                          <a:ea typeface="+mn-ea"/>
+                          <a:cs typeface="+mn-cs"/>
+                        </a:rPr>
+                        <a:t>成果物の名前</a:t>
+                      </a:r>
+                      <a:endParaRPr lang="ja-JP" sz="1600" kern="100" dirty="0">
+                        <a:effectLst/>
+                        <a:latin typeface="Yu Mincho" charset="-128"/>
+                        <a:ea typeface="Yu Mincho" charset="-128"/>
+                        <a:cs typeface="Times New Roman" charset="0"/>
+                      </a:endParaRPr>
+                    </a:p>
+                  </a:txBody>
+                  <a:tcPr marL="58111" marR="58111" marT="0" marB="0" anchor="ctr"/>
+                </a:tc>
+                <a:tc>
+                  <a:txBody>
+                    <a:bodyPr/>
+                    <a:lstStyle/>
+                    <a:p>
+                      <a:pPr algn="ctr">
+                        <a:spcAft>
+                          <a:spcPts val="0"/>
+                        </a:spcAft>
+                      </a:pPr>
+                      <a:r>
+                        <a:rPr lang="ja-JP" altLang="en-US" sz="1600" kern="100" dirty="0" smtClean="0">
+                          <a:effectLst/>
+                          <a:latin typeface="Yu Mincho" charset="-128"/>
+                          <a:ea typeface="Yu Mincho" charset="-128"/>
+                          <a:cs typeface="Times New Roman" charset="0"/>
+                        </a:rPr>
+                        <a:t>公開場所</a:t>
+                      </a:r>
+                      <a:endParaRPr lang="ja-JP" sz="1600" kern="100" dirty="0">
+                        <a:effectLst/>
+                        <a:latin typeface="Yu Mincho" charset="-128"/>
+                        <a:ea typeface="Yu Mincho" charset="-128"/>
+                        <a:cs typeface="Times New Roman" charset="0"/>
+                      </a:endParaRPr>
+                    </a:p>
+                  </a:txBody>
+                  <a:tcPr marL="58111" marR="58111" marT="0" marB="0" anchor="ctr"/>
+                </a:tc>
+                <a:tc>
+                  <a:txBody>
+                    <a:bodyPr/>
+                    <a:lstStyle/>
+                    <a:p>
+                      <a:pPr algn="ctr">
+                        <a:spcAft>
+                          <a:spcPts val="0"/>
+                        </a:spcAft>
+                      </a:pPr>
+                      <a:r>
+                        <a:rPr lang="ja-JP" altLang="en-US" sz="1600" kern="100" dirty="0" smtClean="0">
+                          <a:effectLst/>
+                          <a:latin typeface="Yu Mincho" charset="-128"/>
+                          <a:ea typeface="Yu Mincho" charset="-128"/>
+                          <a:cs typeface="Times New Roman" charset="0"/>
+                        </a:rPr>
+                        <a:t>説明</a:t>
+                      </a:r>
+                      <a:endParaRPr lang="ja-JP" sz="1600" kern="100" dirty="0">
+                        <a:effectLst/>
+                        <a:latin typeface="Yu Mincho" charset="-128"/>
+                        <a:ea typeface="Yu Mincho" charset="-128"/>
+                        <a:cs typeface="Times New Roman" charset="0"/>
+                      </a:endParaRPr>
+                    </a:p>
+                  </a:txBody>
+                  <a:tcPr marL="58111" marR="58111" marT="0" marB="0" anchor="ctr"/>
+                </a:tc>
+                <a:extLst>
+                  <a:ext uri="{0D108BD9-81ED-4DB2-BD59-A6C34878D82A}">
+                    <a16:rowId xmlns:a16="http://schemas.microsoft.com/office/drawing/2014/main" xmlns="" val="10000"/>
+                  </a:ext>
+                </a:extLst>
+              </a:tr>
+              <a:tr h="269288">
+                <a:tc>
+                  <a:txBody>
+                    <a:bodyPr/>
+                    <a:lstStyle/>
+                    <a:p>
+                      <a:pPr algn="ctr">
+                        <a:spcAft>
+                          <a:spcPts val="0"/>
+                        </a:spcAft>
+                      </a:pPr>
+                      <a:r>
+                        <a:rPr lang="en-US" altLang="ja-JP" sz="1800" b="1" kern="100" dirty="0" smtClean="0">
+                          <a:effectLst/>
+                          <a:latin typeface="Yu Mincho" charset="-128"/>
+                          <a:ea typeface="Yu Mincho" charset="-128"/>
+                          <a:cs typeface="Times New Roman" charset="0"/>
+                        </a:rPr>
+                        <a:t>Rest API</a:t>
+                      </a:r>
+                      <a:endParaRPr lang="ja-JP" sz="1800" b="1" kern="100" dirty="0">
+                        <a:effectLst/>
+                        <a:latin typeface="Yu Mincho" charset="-128"/>
+                        <a:ea typeface="Yu Mincho" charset="-128"/>
+                        <a:cs typeface="Times New Roman" charset="0"/>
+                      </a:endParaRPr>
+                    </a:p>
+                  </a:txBody>
+                  <a:tcPr marL="58111" marR="58111" marT="0" marB="0" anchor="ctr"/>
+                </a:tc>
+                <a:tc>
+                  <a:txBody>
+                    <a:bodyPr/>
+                    <a:lstStyle/>
+                    <a:p>
+                      <a:pPr algn="just">
+                        <a:spcAft>
+                          <a:spcPts val="0"/>
+                        </a:spcAft>
+                      </a:pPr>
+                      <a:r>
+                        <a:rPr lang="en-US" altLang="ja-JP" sz="1600" kern="100" dirty="0" smtClean="0">
+                          <a:effectLst/>
+                          <a:latin typeface="Yu Mincho" charset="-128"/>
+                          <a:ea typeface="Yu Mincho" charset="-128"/>
+                          <a:cs typeface="Times New Roman" charset="0"/>
+                          <a:hlinkClick r:id="rId2"/>
+                        </a:rPr>
+                        <a:t>https://github.com/handai-trema/IaaS-team-1/tree/master/restAPI</a:t>
+                      </a:r>
+                      <a:endParaRPr lang="en-US" altLang="ja-JP" sz="1600" kern="100" dirty="0" smtClean="0">
+                        <a:effectLst/>
+                        <a:latin typeface="Yu Mincho" charset="-128"/>
+                        <a:ea typeface="Yu Mincho" charset="-128"/>
+                        <a:cs typeface="Times New Roman" charset="0"/>
+                      </a:endParaRPr>
+                    </a:p>
+                  </a:txBody>
+                  <a:tcPr marL="58111" marR="58111" marT="0" marB="0" anchor="ctr"/>
+                </a:tc>
+                <a:tc>
+                  <a:txBody>
+                    <a:bodyPr/>
+                    <a:lstStyle/>
+                    <a:p>
+                      <a:pPr algn="just">
+                        <a:spcAft>
+                          <a:spcPts val="0"/>
+                        </a:spcAft>
+                      </a:pPr>
+                      <a:r>
+                        <a:rPr lang="en-US" altLang="ja-JP" sz="1600" kern="100" dirty="0" smtClean="0">
+                          <a:effectLst/>
+                          <a:latin typeface="Yu Mincho" charset="-128"/>
+                          <a:ea typeface="Yu Mincho" charset="-128"/>
+                          <a:cs typeface="Times New Roman" charset="0"/>
+                          <a:hlinkClick r:id="rId3"/>
+                        </a:rPr>
+                        <a:t>https://github.com/handai-trema/IaaS-team-1/blob/master/README.md</a:t>
+                      </a:r>
+                      <a:endParaRPr lang="en-US" altLang="ja-JP" sz="1600" kern="100" dirty="0" smtClean="0">
+                        <a:effectLst/>
+                        <a:latin typeface="Yu Mincho" charset="-128"/>
+                        <a:ea typeface="Yu Mincho" charset="-128"/>
+                        <a:cs typeface="Times New Roman" charset="0"/>
+                      </a:endParaRPr>
+                    </a:p>
+                  </a:txBody>
+                  <a:tcPr marL="58111" marR="58111" marT="0" marB="0" anchor="ctr"/>
+                </a:tc>
+                <a:extLst>
+                  <a:ext uri="{0D108BD9-81ED-4DB2-BD59-A6C34878D82A}">
+                    <a16:rowId xmlns:a16="http://schemas.microsoft.com/office/drawing/2014/main" xmlns="" val="10001"/>
+                  </a:ext>
+                </a:extLst>
+              </a:tr>
+              <a:tr h="269288">
+                <a:tc>
+                  <a:txBody>
+                    <a:bodyPr/>
+                    <a:lstStyle/>
+                    <a:p>
+                      <a:pPr algn="ctr">
+                        <a:spcAft>
+                          <a:spcPts val="0"/>
+                        </a:spcAft>
+                      </a:pPr>
+                      <a:r>
+                        <a:rPr lang="en-US" altLang="ja-JP" sz="1800" b="1" kern="100" dirty="0" smtClean="0">
+                          <a:effectLst/>
+                          <a:latin typeface="Yu Mincho" charset="-128"/>
+                          <a:ea typeface="Yu Mincho" charset="-128"/>
+                          <a:cs typeface="Times New Roman" charset="0"/>
+                        </a:rPr>
+                        <a:t>CLI</a:t>
+                      </a:r>
+                      <a:endParaRPr lang="ja-JP" sz="1800" b="1" kern="100" dirty="0">
+                        <a:effectLst/>
+                        <a:latin typeface="Yu Mincho" charset="-128"/>
+                        <a:ea typeface="Yu Mincho" charset="-128"/>
+                        <a:cs typeface="Times New Roman" charset="0"/>
+                      </a:endParaRPr>
+                    </a:p>
+                  </a:txBody>
+                  <a:tcPr marL="58111" marR="58111" marT="0" marB="0" anchor="ctr"/>
+                </a:tc>
+                <a:tc>
+                  <a:txBody>
+                    <a:bodyPr/>
+                    <a:lstStyle/>
+                    <a:p>
+                      <a:pPr algn="just">
+                        <a:spcAft>
+                          <a:spcPts val="0"/>
+                        </a:spcAft>
+                      </a:pPr>
+                      <a:r>
+                        <a:rPr lang="en-US" altLang="ja-JP" sz="1600" kern="100" dirty="0" smtClean="0">
+                          <a:effectLst/>
+                          <a:latin typeface="Yu Mincho" charset="-128"/>
+                          <a:ea typeface="Yu Mincho" charset="-128"/>
+                          <a:cs typeface="Times New Roman" charset="0"/>
+                          <a:hlinkClick r:id="rId2"/>
+                        </a:rPr>
+                        <a:t>https://github.com/handai-trema/IaaS-team-1/tree/master/restAPI</a:t>
+                      </a:r>
+                      <a:endParaRPr lang="ja-JP" sz="1600" kern="100" dirty="0">
+                        <a:effectLst/>
+                        <a:latin typeface="Yu Mincho" charset="-128"/>
+                        <a:ea typeface="Yu Mincho" charset="-128"/>
+                        <a:cs typeface="Times New Roman" charset="0"/>
+                      </a:endParaRPr>
+                    </a:p>
+                  </a:txBody>
+                  <a:tcPr marL="58111" marR="58111" marT="0" marB="0" anchor="ctr"/>
+                </a:tc>
+                <a:tc>
+                  <a:txBody>
+                    <a:bodyPr/>
+                    <a:lstStyle/>
+                    <a:p>
+                      <a:pPr algn="just">
+                        <a:spcAft>
+                          <a:spcPts val="0"/>
+                        </a:spcAft>
+                      </a:pPr>
+                      <a:r>
+                        <a:rPr lang="en-US" altLang="ja-JP" sz="1600" kern="100" dirty="0" smtClean="0">
+                          <a:effectLst/>
+                          <a:latin typeface="Yu Mincho" charset="-128"/>
+                          <a:ea typeface="Yu Mincho" charset="-128"/>
+                          <a:cs typeface="Times New Roman" charset="0"/>
+                          <a:hlinkClick r:id="rId3"/>
+                        </a:rPr>
+                        <a:t>https://github.com/handai-trema/IaaS-team-1/blob/master/README.md</a:t>
+                      </a:r>
+                      <a:endParaRPr lang="en-US" altLang="ja-JP" sz="1600" kern="100" dirty="0" smtClean="0">
+                        <a:effectLst/>
+                        <a:latin typeface="Yu Mincho" charset="-128"/>
+                        <a:ea typeface="Yu Mincho" charset="-128"/>
+                        <a:cs typeface="Times New Roman" charset="0"/>
+                      </a:endParaRPr>
+                    </a:p>
+                  </a:txBody>
+                  <a:tcPr marL="58111" marR="58111" marT="0" marB="0" anchor="ctr"/>
+                </a:tc>
+              </a:tr>
+            </a:tbl>
+          </a:graphicData>
+        </a:graphic>
+      </p:graphicFrame>
+      <p:sp>
+        <p:nvSpPr>
+          <p:cNvPr id="7" name="正方形/長方形 6"/>
+          <p:cNvSpPr/>
+          <p:nvPr/>
+        </p:nvSpPr>
+        <p:spPr>
+          <a:xfrm>
+            <a:off x="4136820" y="2044541"/>
+            <a:ext cx="3701654" cy="369332"/>
+          </a:xfrm>
+          <a:prstGeom prst="rect">
+            <a:avLst/>
+          </a:prstGeom>
+        </p:spPr>
+        <p:txBody>
+          <a:bodyPr wrap="none">
+            <a:spAutoFit/>
+          </a:bodyPr>
+          <a:lstStyle/>
+          <a:p>
+            <a:r>
+              <a:rPr lang="ja-JP" altLang="ja-JP" i="1" dirty="0" smtClean="0">
+                <a:effectLst/>
+                <a:ea typeface="HGPGothicE" charset="-128"/>
+                <a:cs typeface="Times New Roman" charset="0"/>
+              </a:rPr>
+              <a:t>表</a:t>
+            </a:r>
+            <a:r>
+              <a:rPr lang="ja-JP" altLang="en-US" i="1" smtClean="0">
+                <a:effectLst/>
+                <a:ea typeface="HGPGothicE" charset="-128"/>
+                <a:cs typeface="Times New Roman" charset="0"/>
+              </a:rPr>
+              <a:t>６</a:t>
+            </a:r>
+            <a:r>
+              <a:rPr lang="ja-JP" altLang="ja-JP" i="1" smtClean="0">
+                <a:effectLst/>
+                <a:ea typeface="HGPGothicE" charset="-128"/>
+                <a:cs typeface="Times New Roman" charset="0"/>
+              </a:rPr>
+              <a:t>．</a:t>
+            </a:r>
+            <a:r>
+              <a:rPr lang="ja-JP" altLang="en-US" i="1" smtClean="0">
+                <a:effectLst/>
+                <a:ea typeface="HGPGothicE" charset="-128"/>
+                <a:cs typeface="Times New Roman" charset="0"/>
+              </a:rPr>
+              <a:t>成果物の公開場所とその説明</a:t>
+            </a:r>
+            <a:r>
+              <a:rPr lang="ja-JP" altLang="ja-JP" smtClean="0">
+                <a:effectLst/>
+              </a:rPr>
+              <a:t> </a:t>
+            </a:r>
+            <a:endParaRPr lang="ja-JP" altLang="en-US" dirty="0"/>
           </a:p>
         </p:txBody>
       </p:sp>
@@ -8755,21 +9117,21 @@
                 <a:gridCol w="2536853">
                   <a:extLst>
                     <a:ext uri="{9D8B030D-6E8A-4147-A177-3AD203B41FA5}">
-                      <a16:colId xmlns:a16="http://schemas.microsoft.com/office/drawing/2014/main" val="20000"/>
+                      <a16:colId xmlns:a16="http://schemas.microsoft.com/office/drawing/2014/main" xmlns="" val="20000"/>
                     </a:ext>
                   </a:extLst>
                 </a:gridCol>
                 <a:gridCol w="3177556">
                   <a:extLst>
                     <a:ext uri="{9D8B030D-6E8A-4147-A177-3AD203B41FA5}">
-                      <a16:colId xmlns:a16="http://schemas.microsoft.com/office/drawing/2014/main" val="20001"/>
+                      <a16:colId xmlns:a16="http://schemas.microsoft.com/office/drawing/2014/main" xmlns="" val="20001"/>
                     </a:ext>
                   </a:extLst>
                 </a:gridCol>
                 <a:gridCol w="4219435">
                   <a:extLst>
                     <a:ext uri="{9D8B030D-6E8A-4147-A177-3AD203B41FA5}">
-                      <a16:colId xmlns:a16="http://schemas.microsoft.com/office/drawing/2014/main" val="20002"/>
+                      <a16:colId xmlns:a16="http://schemas.microsoft.com/office/drawing/2014/main" xmlns="" val="20002"/>
                     </a:ext>
                   </a:extLst>
                 </a:gridCol>
@@ -8855,7 +9217,7 @@
                 </a:tc>
                 <a:extLst>
                   <a:ext uri="{0D108BD9-81ED-4DB2-BD59-A6C34878D82A}">
-                    <a16:rowId xmlns:a16="http://schemas.microsoft.com/office/drawing/2014/main" val="10000"/>
+                    <a16:rowId xmlns:a16="http://schemas.microsoft.com/office/drawing/2014/main" xmlns="" val="10000"/>
                   </a:ext>
                 </a:extLst>
               </a:tr>
@@ -8953,7 +9315,7 @@
                 </a:tc>
                 <a:extLst>
                   <a:ext uri="{0D108BD9-81ED-4DB2-BD59-A6C34878D82A}">
-                    <a16:rowId xmlns:a16="http://schemas.microsoft.com/office/drawing/2014/main" val="10001"/>
+                    <a16:rowId xmlns:a16="http://schemas.microsoft.com/office/drawing/2014/main" xmlns="" val="10001"/>
                   </a:ext>
                 </a:extLst>
               </a:tr>
@@ -9057,7 +9419,7 @@
                 </a:tc>
                 <a:extLst>
                   <a:ext uri="{0D108BD9-81ED-4DB2-BD59-A6C34878D82A}">
-                    <a16:rowId xmlns:a16="http://schemas.microsoft.com/office/drawing/2014/main" val="10002"/>
+                    <a16:rowId xmlns:a16="http://schemas.microsoft.com/office/drawing/2014/main" xmlns="" val="10002"/>
                   </a:ext>
                 </a:extLst>
               </a:tr>
@@ -9167,7 +9529,7 @@
                 </a:tc>
                 <a:extLst>
                   <a:ext uri="{0D108BD9-81ED-4DB2-BD59-A6C34878D82A}">
-                    <a16:rowId xmlns:a16="http://schemas.microsoft.com/office/drawing/2014/main" val="10003"/>
+                    <a16:rowId xmlns:a16="http://schemas.microsoft.com/office/drawing/2014/main" xmlns="" val="10003"/>
                   </a:ext>
                 </a:extLst>
               </a:tr>
@@ -9253,7 +9615,7 @@
                 </a:tc>
                 <a:extLst>
                   <a:ext uri="{0D108BD9-81ED-4DB2-BD59-A6C34878D82A}">
-                    <a16:rowId xmlns:a16="http://schemas.microsoft.com/office/drawing/2014/main" val="10004"/>
+                    <a16:rowId xmlns:a16="http://schemas.microsoft.com/office/drawing/2014/main" xmlns="" val="10004"/>
                   </a:ext>
                 </a:extLst>
               </a:tr>
@@ -9351,7 +9713,7 @@
                 </a:tc>
                 <a:extLst>
                   <a:ext uri="{0D108BD9-81ED-4DB2-BD59-A6C34878D82A}">
-                    <a16:rowId xmlns:a16="http://schemas.microsoft.com/office/drawing/2014/main" val="10005"/>
+                    <a16:rowId xmlns:a16="http://schemas.microsoft.com/office/drawing/2014/main" xmlns="" val="10005"/>
                   </a:ext>
                 </a:extLst>
               </a:tr>
@@ -13770,14 +14132,14 @@
               <a:buChar char="•"/>
             </a:pPr>
             <a:r>
-              <a:rPr lang="ja-JP" altLang="en-US" sz="2800" dirty="0">
+              <a:rPr lang="ja-JP" altLang="en-US" sz="2800" dirty="0" smtClean="0">
                 <a:latin typeface="HGGothicE" charset="-128"/>
                 <a:ea typeface="HGGothicE" charset="-128"/>
                 <a:cs typeface="HGGothicE" charset="-128"/>
               </a:rPr>
               <a:t>工夫点：ポートをスライスに割り当て</a:t>
             </a:r>
-            <a:endParaRPr lang="en-US" altLang="ja-JP" sz="2800" dirty="0">
+            <a:endParaRPr lang="en-US" altLang="ja-JP" sz="2800" dirty="0" smtClean="0">
               <a:latin typeface="HGGothicE" charset="-128"/>
               <a:ea typeface="HGGothicE" charset="-128"/>
               <a:cs typeface="HGGothicE" charset="-128"/>
@@ -13788,13 +14150,21 @@
               <a:buFont typeface="Arial" charset="0"/>
               <a:buChar char="•"/>
             </a:pPr>
+            <a:r>
+              <a:rPr lang="ja-JP" altLang="en-US" sz="2400" dirty="0" smtClean="0">
+                <a:latin typeface="HGGothicE" charset="-128"/>
+                <a:ea typeface="HGGothicE" charset="-128"/>
+                <a:cs typeface="HGGothicE" charset="-128"/>
+              </a:rPr>
+              <a:t>スライス</a:t>
+            </a:r>
             <a:r>
               <a:rPr lang="ja-JP" altLang="en-US" sz="2400" dirty="0">
                 <a:latin typeface="HGGothicE" charset="-128"/>
                 <a:ea typeface="HGGothicE" charset="-128"/>
                 <a:cs typeface="HGGothicE" charset="-128"/>
               </a:rPr>
-              <a:t>スライスに割り当てる要素に</a:t>
+              <a:t>に割り当てる要素に</a:t>
             </a:r>
             <a:r>
               <a:rPr lang="en-US" altLang="ja-JP" sz="2400" dirty="0">

</xml_diff>

<commit_message>
Delete comments & Complete this report.
</commit_message>
<xml_diff>
--- a/FinalReport_team1.pptx
+++ b/FinalReport_team1.pptx
@@ -183,46 +183,6 @@
 </p:cmLst>
 </file>
 
-<file path=ppt/comments/comment2.xml><?xml version="1.0" encoding="utf-8"?>
-<p:cmLst xmlns:a="http://schemas.openxmlformats.org/drawingml/2006/main" xmlns:r="http://schemas.openxmlformats.org/officeDocument/2006/relationships" xmlns:p="http://schemas.openxmlformats.org/presentationml/2006/main">
-  <p:cm authorId="7" dt="2017-02-02T10:09:36.050" idx="1">
-    <p:pos x="3811" y="771"/>
-    <p:text>最終発表のスライドをそのまま載せました．
-下記のデモ内容が予定していたものと異なる場合は未だ書いてません．
-以下メールより引用
-----------
-デモ内容の説明
-（今日のスライドをベースにしてもOK）
-  - デモの内容が当初予定していたものと異なる場合は以下も明記
-    - 差が出た要因
-    - 予定通りに進まなかった要因
-  - OpenFlowが，どこに，どのように使われているかが明記されていない場合はそれも明記
-</p:text>
-    <p:extLst>
-      <p:ext uri="{C676402C-5697-4E1C-873F-D02D1690AC5C}">
-        <p15:threadingInfo xmlns:p15="http://schemas.microsoft.com/office/powerpoint/2012/main" timeZoneBias="-540"/>
-      </p:ext>
-    </p:extLst>
-  </p:cm>
-</p:cmLst>
-</file>
-
-<file path=ppt/comments/comment3.xml><?xml version="1.0" encoding="utf-8"?>
-<p:cmLst xmlns:a="http://schemas.openxmlformats.org/drawingml/2006/main" xmlns:r="http://schemas.openxmlformats.org/officeDocument/2006/relationships" xmlns:p="http://schemas.openxmlformats.org/presentationml/2006/main">
-  <p:cm authorId="5" dt="2017-02-02T09:37:28.363" idx="1">
-    <p:pos x="475" y="1318"/>
-    <p:text>各自で自分の役割を編集してください．
-見やすさのためにリスト形式にしていますが，特に意味はございません．
-Edit your works.</p:text>
-    <p:extLst>
-      <p:ext uri="{C676402C-5697-4E1C-873F-D02D1690AC5C}">
-        <p15:threadingInfo xmlns:p15="http://schemas.microsoft.com/office/powerpoint/2012/main" timeZoneBias="-540"/>
-      </p:ext>
-    </p:extLst>
-  </p:cm>
-</p:cmLst>
-</file>
-
 <file path=ppt/notesMasters/notesMaster1.xml><?xml version="1.0" encoding="utf-8"?>
 <p:notesMaster xmlns:a="http://schemas.openxmlformats.org/drawingml/2006/main" xmlns:r="http://schemas.openxmlformats.org/officeDocument/2006/relationships" xmlns:p="http://schemas.openxmlformats.org/presentationml/2006/main">
   <p:cSld>
@@ -305,7 +265,7 @@
           <a:p>
             <a:fld id="{D3280593-7C42-5843-B081-6C518870F69D}" type="datetimeFigureOut">
               <a:rPr kumimoji="1" lang="ja-JP" altLang="en-US" smtClean="0"/>
-              <a:t>2017/2/4</a:t>
+              <a:t>2017/2/6</a:t>
             </a:fld>
             <a:endParaRPr kumimoji="1" lang="ja-JP" altLang="en-US"/>
           </a:p>
@@ -820,7 +780,7 @@
           <a:p>
             <a:fld id="{66799932-8D7B-764F-9326-29DDE68D3EAA}" type="datetime1">
               <a:rPr kumimoji="1" lang="ja-JP" altLang="en-US" smtClean="0"/>
-              <a:t>2017/2/4</a:t>
+              <a:t>2017/2/6</a:t>
             </a:fld>
             <a:endParaRPr kumimoji="1" lang="ja-JP" altLang="en-US"/>
           </a:p>
@@ -1022,7 +982,7 @@
           <a:p>
             <a:fld id="{CAE5463A-7E1A-2E4B-B0AE-41A6BD3235AF}" type="datetime1">
               <a:rPr kumimoji="1" lang="ja-JP" altLang="en-US" smtClean="0"/>
-              <a:t>2017/2/4</a:t>
+              <a:t>2017/2/6</a:t>
             </a:fld>
             <a:endParaRPr kumimoji="1" lang="ja-JP" altLang="en-US"/>
           </a:p>
@@ -1234,7 +1194,7 @@
           <a:p>
             <a:fld id="{CE374C79-7A9D-4D49-8376-FB8336C03319}" type="datetime1">
               <a:rPr kumimoji="1" lang="ja-JP" altLang="en-US" smtClean="0"/>
-              <a:t>2017/2/4</a:t>
+              <a:t>2017/2/6</a:t>
             </a:fld>
             <a:endParaRPr kumimoji="1" lang="ja-JP" altLang="en-US"/>
           </a:p>
@@ -1436,7 +1396,7 @@
           <a:p>
             <a:fld id="{E76F834C-CEFA-9D46-A7A9-2A9FAB28DDD1}" type="datetime1">
               <a:rPr kumimoji="1" lang="ja-JP" altLang="en-US" smtClean="0"/>
-              <a:t>2017/2/4</a:t>
+              <a:t>2017/2/6</a:t>
             </a:fld>
             <a:endParaRPr kumimoji="1" lang="ja-JP" altLang="en-US"/>
           </a:p>
@@ -1682,7 +1642,7 @@
           <a:p>
             <a:fld id="{9EAA5CF6-2B4A-2E44-93BE-A2EE45AF8E02}" type="datetime1">
               <a:rPr kumimoji="1" lang="ja-JP" altLang="en-US" smtClean="0"/>
-              <a:t>2017/2/4</a:t>
+              <a:t>2017/2/6</a:t>
             </a:fld>
             <a:endParaRPr kumimoji="1" lang="ja-JP" altLang="en-US"/>
           </a:p>
@@ -1978,7 +1938,7 @@
           <a:p>
             <a:fld id="{47F3C8BD-19CC-7047-9A9E-B4334F8EB4A3}" type="datetime1">
               <a:rPr kumimoji="1" lang="ja-JP" altLang="en-US" smtClean="0"/>
-              <a:t>2017/2/4</a:t>
+              <a:t>2017/2/6</a:t>
             </a:fld>
             <a:endParaRPr kumimoji="1" lang="ja-JP" altLang="en-US"/>
           </a:p>
@@ -2409,7 +2369,7 @@
           <a:p>
             <a:fld id="{0CE0FDFE-8C98-DA42-9AAE-A8374B2C458A}" type="datetime1">
               <a:rPr kumimoji="1" lang="ja-JP" altLang="en-US" smtClean="0"/>
-              <a:t>2017/2/4</a:t>
+              <a:t>2017/2/6</a:t>
             </a:fld>
             <a:endParaRPr kumimoji="1" lang="ja-JP" altLang="en-US"/>
           </a:p>
@@ -2527,7 +2487,7 @@
           <a:p>
             <a:fld id="{596E8ED7-F57B-B540-A070-084317F58026}" type="datetime1">
               <a:rPr kumimoji="1" lang="ja-JP" altLang="en-US" smtClean="0"/>
-              <a:t>2017/2/4</a:t>
+              <a:t>2017/2/6</a:t>
             </a:fld>
             <a:endParaRPr kumimoji="1" lang="ja-JP" altLang="en-US"/>
           </a:p>
@@ -2622,7 +2582,7 @@
           <a:p>
             <a:fld id="{B4708856-CBAF-AB47-9335-89045B7F966D}" type="datetime1">
               <a:rPr kumimoji="1" lang="ja-JP" altLang="en-US" smtClean="0"/>
-              <a:t>2017/2/4</a:t>
+              <a:t>2017/2/6</a:t>
             </a:fld>
             <a:endParaRPr kumimoji="1" lang="ja-JP" altLang="en-US"/>
           </a:p>
@@ -2931,7 +2891,7 @@
           <a:p>
             <a:fld id="{FF17E302-1DC0-9947-8E9A-89DEC6D799BE}" type="datetime1">
               <a:rPr kumimoji="1" lang="ja-JP" altLang="en-US" smtClean="0"/>
-              <a:t>2017/2/4</a:t>
+              <a:t>2017/2/6</a:t>
             </a:fld>
             <a:endParaRPr kumimoji="1" lang="ja-JP" altLang="en-US"/>
           </a:p>
@@ -3184,7 +3144,7 @@
           <a:p>
             <a:fld id="{828D861D-5ABD-5D42-A35A-D470506FAF5E}" type="datetime1">
               <a:rPr kumimoji="1" lang="ja-JP" altLang="en-US" smtClean="0"/>
-              <a:t>2017/2/4</a:t>
+              <a:t>2017/2/6</a:t>
             </a:fld>
             <a:endParaRPr kumimoji="1" lang="ja-JP" altLang="en-US"/>
           </a:p>
@@ -3432,7 +3392,7 @@
           <a:p>
             <a:fld id="{40E3953F-FE39-2447-83E0-87C2306981C2}" type="datetime1">
               <a:rPr lang="ja-JP" altLang="en-US" smtClean="0"/>
-              <a:t>2017/2/4</a:t>
+              <a:t>2017/2/6</a:t>
             </a:fld>
             <a:endParaRPr lang="ja-JP" altLang="en-US"/>
           </a:p>
@@ -3996,7 +3956,7 @@
                 <a:ea typeface="Yu Mincho" charset="-128"/>
                 <a:cs typeface="Times New Roman" charset="0"/>
               </a:rPr>
-              <a:t>2017/02/??(??.) </a:t>
+              <a:t>2017/02/07(Tue.) </a:t>
             </a:r>
             <a:r>
               <a:rPr lang="ja-JP" altLang="ja-JP" sz="2400" kern="100" dirty="0" smtClean="0">
@@ -8334,14 +8294,14 @@
                 <a:gridCol w="2373131">
                   <a:extLst>
                     <a:ext uri="{9D8B030D-6E8A-4147-A177-3AD203B41FA5}">
-                      <a16:colId xmlns:a16="http://schemas.microsoft.com/office/drawing/2014/main" xmlns="" val="20000"/>
+                      <a16:colId xmlns="" xmlns:a16="http://schemas.microsoft.com/office/drawing/2014/main" val="20000"/>
                     </a:ext>
                   </a:extLst>
                 </a:gridCol>
                 <a:gridCol w="3984996">
                   <a:extLst>
                     <a:ext uri="{9D8B030D-6E8A-4147-A177-3AD203B41FA5}">
-                      <a16:colId xmlns:a16="http://schemas.microsoft.com/office/drawing/2014/main" xmlns="" val="20001"/>
+                      <a16:colId xmlns="" xmlns:a16="http://schemas.microsoft.com/office/drawing/2014/main" val="20001"/>
                     </a:ext>
                   </a:extLst>
                 </a:gridCol>
@@ -8401,7 +8361,7 @@
                 </a:tc>
                 <a:extLst>
                   <a:ext uri="{0D108BD9-81ED-4DB2-BD59-A6C34878D82A}">
-                    <a16:rowId xmlns:a16="http://schemas.microsoft.com/office/drawing/2014/main" xmlns="" val="10000"/>
+                    <a16:rowId xmlns="" xmlns:a16="http://schemas.microsoft.com/office/drawing/2014/main" val="10000"/>
                   </a:ext>
                 </a:extLst>
               </a:tr>
@@ -8478,7 +8438,7 @@
                 </a:tc>
                 <a:extLst>
                   <a:ext uri="{0D108BD9-81ED-4DB2-BD59-A6C34878D82A}">
-                    <a16:rowId xmlns:a16="http://schemas.microsoft.com/office/drawing/2014/main" xmlns="" val="10001"/>
+                    <a16:rowId xmlns="" xmlns:a16="http://schemas.microsoft.com/office/drawing/2014/main" val="10001"/>
                   </a:ext>
                 </a:extLst>
               </a:tr>
@@ -8571,7 +8531,7 @@
                 </a:tc>
                 <a:extLst>
                   <a:ext uri="{0D108BD9-81ED-4DB2-BD59-A6C34878D82A}">
-                    <a16:rowId xmlns:a16="http://schemas.microsoft.com/office/drawing/2014/main" xmlns="" val="10002"/>
+                    <a16:rowId xmlns="" xmlns:a16="http://schemas.microsoft.com/office/drawing/2014/main" val="10002"/>
                   </a:ext>
                 </a:extLst>
               </a:tr>
@@ -8654,7 +8614,7 @@
                 </a:tc>
                 <a:extLst>
                   <a:ext uri="{0D108BD9-81ED-4DB2-BD59-A6C34878D82A}">
-                    <a16:rowId xmlns:a16="http://schemas.microsoft.com/office/drawing/2014/main" xmlns="" val="10004"/>
+                    <a16:rowId xmlns="" xmlns:a16="http://schemas.microsoft.com/office/drawing/2014/main" val="10004"/>
                   </a:ext>
                 </a:extLst>
               </a:tr>
@@ -8749,7 +8709,7 @@
                 </a:tc>
                 <a:extLst>
                   <a:ext uri="{0D108BD9-81ED-4DB2-BD59-A6C34878D82A}">
-                    <a16:rowId xmlns:a16="http://schemas.microsoft.com/office/drawing/2014/main" xmlns="" val="10005"/>
+                    <a16:rowId xmlns="" xmlns:a16="http://schemas.microsoft.com/office/drawing/2014/main" val="10005"/>
                   </a:ext>
                 </a:extLst>
               </a:tr>
@@ -8838,7 +8798,7 @@
                 </a:tc>
                 <a:extLst>
                   <a:ext uri="{0D108BD9-81ED-4DB2-BD59-A6C34878D82A}">
-                    <a16:rowId xmlns:a16="http://schemas.microsoft.com/office/drawing/2014/main" xmlns="" val="10006"/>
+                    <a16:rowId xmlns="" xmlns:a16="http://schemas.microsoft.com/office/drawing/2014/main" val="10006"/>
                   </a:ext>
                 </a:extLst>
               </a:tr>
@@ -8921,7 +8881,7 @@
                 </a:tc>
                 <a:extLst>
                   <a:ext uri="{0D108BD9-81ED-4DB2-BD59-A6C34878D82A}">
-                    <a16:rowId xmlns:a16="http://schemas.microsoft.com/office/drawing/2014/main" xmlns="" val="10007"/>
+                    <a16:rowId xmlns="" xmlns:a16="http://schemas.microsoft.com/office/drawing/2014/main" val="10007"/>
                   </a:ext>
                 </a:extLst>
               </a:tr>
@@ -9004,7 +8964,7 @@
                 </a:tc>
                 <a:extLst>
                   <a:ext uri="{0D108BD9-81ED-4DB2-BD59-A6C34878D82A}">
-                    <a16:rowId xmlns:a16="http://schemas.microsoft.com/office/drawing/2014/main" xmlns="" val="10008"/>
+                    <a16:rowId xmlns="" xmlns:a16="http://schemas.microsoft.com/office/drawing/2014/main" val="10008"/>
                   </a:ext>
                 </a:extLst>
               </a:tr>
@@ -9087,7 +9047,7 @@
                 </a:tc>
                 <a:extLst>
                   <a:ext uri="{0D108BD9-81ED-4DB2-BD59-A6C34878D82A}">
-                    <a16:rowId xmlns:a16="http://schemas.microsoft.com/office/drawing/2014/main" xmlns="" val="10009"/>
+                    <a16:rowId xmlns="" xmlns:a16="http://schemas.microsoft.com/office/drawing/2014/main" val="10009"/>
                   </a:ext>
                 </a:extLst>
               </a:tr>
@@ -9158,7 +9118,7 @@
                 </a:tc>
                 <a:extLst>
                   <a:ext uri="{0D108BD9-81ED-4DB2-BD59-A6C34878D82A}">
-                    <a16:rowId xmlns:a16="http://schemas.microsoft.com/office/drawing/2014/main" xmlns="" val="10010"/>
+                    <a16:rowId xmlns="" xmlns:a16="http://schemas.microsoft.com/office/drawing/2014/main" val="10010"/>
                   </a:ext>
                 </a:extLst>
               </a:tr>
@@ -9217,7 +9177,7 @@
                 </a:tc>
                 <a:extLst>
                   <a:ext uri="{0D108BD9-81ED-4DB2-BD59-A6C34878D82A}">
-                    <a16:rowId xmlns:a16="http://schemas.microsoft.com/office/drawing/2014/main" xmlns="" val="10011"/>
+                    <a16:rowId xmlns="" xmlns:a16="http://schemas.microsoft.com/office/drawing/2014/main" val="10011"/>
                   </a:ext>
                 </a:extLst>
               </a:tr>
@@ -9306,7 +9266,7 @@
                 </a:tc>
                 <a:extLst>
                   <a:ext uri="{0D108BD9-81ED-4DB2-BD59-A6C34878D82A}">
-                    <a16:rowId xmlns:a16="http://schemas.microsoft.com/office/drawing/2014/main" xmlns="" val="10012"/>
+                    <a16:rowId xmlns="" xmlns:a16="http://schemas.microsoft.com/office/drawing/2014/main" val="10012"/>
                   </a:ext>
                 </a:extLst>
               </a:tr>
@@ -9377,7 +9337,7 @@
                 </a:tc>
                 <a:extLst>
                   <a:ext uri="{0D108BD9-81ED-4DB2-BD59-A6C34878D82A}">
-                    <a16:rowId xmlns:a16="http://schemas.microsoft.com/office/drawing/2014/main" xmlns="" val="10013"/>
+                    <a16:rowId xmlns="" xmlns:a16="http://schemas.microsoft.com/office/drawing/2014/main" val="10013"/>
                   </a:ext>
                 </a:extLst>
               </a:tr>
@@ -9472,7 +9432,7 @@
                 </a:tc>
                 <a:extLst>
                   <a:ext uri="{0D108BD9-81ED-4DB2-BD59-A6C34878D82A}">
-                    <a16:rowId xmlns:a16="http://schemas.microsoft.com/office/drawing/2014/main" xmlns="" val="10014"/>
+                    <a16:rowId xmlns="" xmlns:a16="http://schemas.microsoft.com/office/drawing/2014/main" val="10014"/>
                   </a:ext>
                 </a:extLst>
               </a:tr>
@@ -9543,7 +9503,7 @@
                 </a:tc>
                 <a:extLst>
                   <a:ext uri="{0D108BD9-81ED-4DB2-BD59-A6C34878D82A}">
-                    <a16:rowId xmlns:a16="http://schemas.microsoft.com/office/drawing/2014/main" xmlns="" val="10015"/>
+                    <a16:rowId xmlns="" xmlns:a16="http://schemas.microsoft.com/office/drawing/2014/main" val="10015"/>
                   </a:ext>
                 </a:extLst>
               </a:tr>
@@ -9624,7 +9584,7 @@
                 </a:tc>
                 <a:extLst>
                   <a:ext uri="{0D108BD9-81ED-4DB2-BD59-A6C34878D82A}">
-                    <a16:rowId xmlns:a16="http://schemas.microsoft.com/office/drawing/2014/main" xmlns="" val="10016"/>
+                    <a16:rowId xmlns="" xmlns:a16="http://schemas.microsoft.com/office/drawing/2014/main" val="10016"/>
                   </a:ext>
                 </a:extLst>
               </a:tr>
@@ -9707,7 +9667,7 @@
                 </a:tc>
                 <a:extLst>
                   <a:ext uri="{0D108BD9-81ED-4DB2-BD59-A6C34878D82A}">
-                    <a16:rowId xmlns:a16="http://schemas.microsoft.com/office/drawing/2014/main" xmlns="" val="10017"/>
+                    <a16:rowId xmlns="" xmlns:a16="http://schemas.microsoft.com/office/drawing/2014/main" val="10017"/>
                   </a:ext>
                 </a:extLst>
               </a:tr>
@@ -9790,7 +9750,7 @@
                 </a:tc>
                 <a:extLst>
                   <a:ext uri="{0D108BD9-81ED-4DB2-BD59-A6C34878D82A}">
-                    <a16:rowId xmlns:a16="http://schemas.microsoft.com/office/drawing/2014/main" xmlns="" val="10018"/>
+                    <a16:rowId xmlns="" xmlns:a16="http://schemas.microsoft.com/office/drawing/2014/main" val="10018"/>
                   </a:ext>
                 </a:extLst>
               </a:tr>
@@ -9861,7 +9821,7 @@
                 </a:tc>
                 <a:extLst>
                   <a:ext uri="{0D108BD9-81ED-4DB2-BD59-A6C34878D82A}">
-                    <a16:rowId xmlns:a16="http://schemas.microsoft.com/office/drawing/2014/main" xmlns="" val="10019"/>
+                    <a16:rowId xmlns="" xmlns:a16="http://schemas.microsoft.com/office/drawing/2014/main" val="10019"/>
                   </a:ext>
                 </a:extLst>
               </a:tr>
@@ -10057,14 +10017,14 @@
                 <a:gridCol w="2054453">
                   <a:extLst>
                     <a:ext uri="{9D8B030D-6E8A-4147-A177-3AD203B41FA5}">
-                      <a16:colId xmlns:a16="http://schemas.microsoft.com/office/drawing/2014/main" xmlns="" val="20000"/>
+                      <a16:colId xmlns="" xmlns:a16="http://schemas.microsoft.com/office/drawing/2014/main" val="20000"/>
                     </a:ext>
                   </a:extLst>
                 </a:gridCol>
                 <a:gridCol w="4868409">
                   <a:extLst>
                     <a:ext uri="{9D8B030D-6E8A-4147-A177-3AD203B41FA5}">
-                      <a16:colId xmlns:a16="http://schemas.microsoft.com/office/drawing/2014/main" xmlns="" val="20001"/>
+                      <a16:colId xmlns="" xmlns:a16="http://schemas.microsoft.com/office/drawing/2014/main" val="20001"/>
                     </a:ext>
                   </a:extLst>
                 </a:gridCol>
@@ -10124,7 +10084,7 @@
                 </a:tc>
                 <a:extLst>
                   <a:ext uri="{0D108BD9-81ED-4DB2-BD59-A6C34878D82A}">
-                    <a16:rowId xmlns:a16="http://schemas.microsoft.com/office/drawing/2014/main" xmlns="" val="10000"/>
+                    <a16:rowId xmlns="" xmlns:a16="http://schemas.microsoft.com/office/drawing/2014/main" val="10000"/>
                   </a:ext>
                 </a:extLst>
               </a:tr>
@@ -10308,7 +10268,7 @@
                 </a:tc>
                 <a:extLst>
                   <a:ext uri="{0D108BD9-81ED-4DB2-BD59-A6C34878D82A}">
-                    <a16:rowId xmlns:a16="http://schemas.microsoft.com/office/drawing/2014/main" xmlns="" val="10001"/>
+                    <a16:rowId xmlns="" xmlns:a16="http://schemas.microsoft.com/office/drawing/2014/main" val="10001"/>
                   </a:ext>
                 </a:extLst>
               </a:tr>
@@ -10474,7 +10434,7 @@
                 </a:tc>
                 <a:extLst>
                   <a:ext uri="{0D108BD9-81ED-4DB2-BD59-A6C34878D82A}">
-                    <a16:rowId xmlns:a16="http://schemas.microsoft.com/office/drawing/2014/main" xmlns="" val="10002"/>
+                    <a16:rowId xmlns="" xmlns:a16="http://schemas.microsoft.com/office/drawing/2014/main" val="10002"/>
                   </a:ext>
                 </a:extLst>
               </a:tr>
@@ -10619,7 +10579,7 @@
                 </a:tc>
                 <a:extLst>
                   <a:ext uri="{0D108BD9-81ED-4DB2-BD59-A6C34878D82A}">
-                    <a16:rowId xmlns:a16="http://schemas.microsoft.com/office/drawing/2014/main" xmlns="" val="10003"/>
+                    <a16:rowId xmlns="" xmlns:a16="http://schemas.microsoft.com/office/drawing/2014/main" val="10003"/>
                   </a:ext>
                 </a:extLst>
               </a:tr>
@@ -10704,7 +10664,7 @@
                 </a:tc>
                 <a:extLst>
                   <a:ext uri="{0D108BD9-81ED-4DB2-BD59-A6C34878D82A}">
-                    <a16:rowId xmlns:a16="http://schemas.microsoft.com/office/drawing/2014/main" xmlns="" val="10004"/>
+                    <a16:rowId xmlns="" xmlns:a16="http://schemas.microsoft.com/office/drawing/2014/main" val="10004"/>
                   </a:ext>
                 </a:extLst>
               </a:tr>
@@ -10846,7 +10806,7 @@
                 </a:tc>
                 <a:extLst>
                   <a:ext uri="{0D108BD9-81ED-4DB2-BD59-A6C34878D82A}">
-                    <a16:rowId xmlns:a16="http://schemas.microsoft.com/office/drawing/2014/main" xmlns="" val="10005"/>
+                    <a16:rowId xmlns="" xmlns:a16="http://schemas.microsoft.com/office/drawing/2014/main" val="10005"/>
                   </a:ext>
                 </a:extLst>
               </a:tr>
@@ -11058,8 +11018,8 @@
         </p:nvSpPr>
         <p:spPr>
           <a:xfrm>
-            <a:off x="637350" y="1314808"/>
-            <a:ext cx="6013185" cy="369332"/>
+            <a:off x="838200" y="1200310"/>
+            <a:ext cx="5724644" cy="369332"/>
           </a:xfrm>
           <a:prstGeom prst="rect">
             <a:avLst/>
@@ -11071,10 +11031,6 @@
           </a:bodyPr>
           <a:lstStyle/>
           <a:p>
-            <a:pPr marL="285750" indent="-285750">
-              <a:buFont typeface="Arial" charset="0"/>
-              <a:buChar char="•"/>
-            </a:pPr>
             <a:r>
               <a:rPr lang="ja-JP" altLang="en-US" dirty="0" smtClean="0">
                 <a:latin typeface="HGGothicE" charset="-128"/>
@@ -11119,21 +11075,21 @@
                 <a:gridCol w="1762457">
                   <a:extLst>
                     <a:ext uri="{9D8B030D-6E8A-4147-A177-3AD203B41FA5}">
-                      <a16:colId xmlns:a16="http://schemas.microsoft.com/office/drawing/2014/main" xmlns="" val="20000"/>
+                      <a16:colId xmlns="" xmlns:a16="http://schemas.microsoft.com/office/drawing/2014/main" val="20000"/>
                     </a:ext>
                   </a:extLst>
                 </a:gridCol>
                 <a:gridCol w="2959542">
                   <a:extLst>
                     <a:ext uri="{9D8B030D-6E8A-4147-A177-3AD203B41FA5}">
-                      <a16:colId xmlns:a16="http://schemas.microsoft.com/office/drawing/2014/main" xmlns="" val="20001"/>
+                      <a16:colId xmlns="" xmlns:a16="http://schemas.microsoft.com/office/drawing/2014/main" val="20001"/>
                     </a:ext>
                   </a:extLst>
                 </a:gridCol>
                 <a:gridCol w="2959542">
                   <a:extLst>
                     <a:ext uri="{9D8B030D-6E8A-4147-A177-3AD203B41FA5}">
-                      <a16:colId xmlns:a16="http://schemas.microsoft.com/office/drawing/2014/main" xmlns="" val="20002"/>
+                      <a16:colId xmlns="" xmlns:a16="http://schemas.microsoft.com/office/drawing/2014/main" val="20002"/>
                     </a:ext>
                   </a:extLst>
                 </a:gridCol>
@@ -11228,7 +11184,7 @@
                 </a:tc>
                 <a:extLst>
                   <a:ext uri="{0D108BD9-81ED-4DB2-BD59-A6C34878D82A}">
-                    <a16:rowId xmlns:a16="http://schemas.microsoft.com/office/drawing/2014/main" xmlns="" val="10000"/>
+                    <a16:rowId xmlns="" xmlns:a16="http://schemas.microsoft.com/office/drawing/2014/main" val="10000"/>
                   </a:ext>
                 </a:extLst>
               </a:tr>
@@ -11324,7 +11280,7 @@
                 </a:tc>
                 <a:extLst>
                   <a:ext uri="{0D108BD9-81ED-4DB2-BD59-A6C34878D82A}">
-                    <a16:rowId xmlns:a16="http://schemas.microsoft.com/office/drawing/2014/main" xmlns="" val="10001"/>
+                    <a16:rowId xmlns="" xmlns:a16="http://schemas.microsoft.com/office/drawing/2014/main" val="10001"/>
                   </a:ext>
                 </a:extLst>
               </a:tr>
@@ -11400,7 +11356,7 @@
                 </a:tc>
                 <a:extLst>
                   <a:ext uri="{0D108BD9-81ED-4DB2-BD59-A6C34878D82A}">
-                    <a16:rowId xmlns:a16="http://schemas.microsoft.com/office/drawing/2014/main" xmlns="" val="10002"/>
+                    <a16:rowId xmlns="" xmlns:a16="http://schemas.microsoft.com/office/drawing/2014/main" val="10002"/>
                   </a:ext>
                 </a:extLst>
               </a:tr>
@@ -11498,7 +11454,7 @@
                 </a:tc>
                 <a:extLst>
                   <a:ext uri="{0D108BD9-81ED-4DB2-BD59-A6C34878D82A}">
-                    <a16:rowId xmlns:a16="http://schemas.microsoft.com/office/drawing/2014/main" xmlns="" val="1898541787"/>
+                    <a16:rowId xmlns="" xmlns:a16="http://schemas.microsoft.com/office/drawing/2014/main" val="1898541787"/>
                   </a:ext>
                 </a:extLst>
               </a:tr>
@@ -11618,8 +11574,8 @@
         </p:nvSpPr>
         <p:spPr>
           <a:xfrm>
-            <a:off x="838200" y="0"/>
-            <a:ext cx="10515600" cy="1094740"/>
+            <a:off x="1602697" y="314793"/>
+            <a:ext cx="7556293" cy="958214"/>
           </a:xfrm>
         </p:spPr>
         <p:txBody>
@@ -11648,7 +11604,7 @@
         </p:nvSpPr>
         <p:spPr>
           <a:xfrm>
-            <a:off x="2191512" y="1140777"/>
+            <a:off x="2660353" y="1140777"/>
             <a:ext cx="8086344" cy="5398135"/>
           </a:xfrm>
         </p:spPr>
@@ -11901,7 +11857,7 @@
           <p:nvPr>
             <p:extLst>
               <p:ext uri="{D42A27DB-BD31-4B8C-83A1-F6EECF244321}">
-                <p14:modId xmlns:p14="http://schemas.microsoft.com/office/powerpoint/2010/main" val="2885436585"/>
+                <p14:modId xmlns:p14="http://schemas.microsoft.com/office/powerpoint/2010/main" val="1313479307"/>
               </p:ext>
             </p:extLst>
           </p:nvPr>
@@ -11920,21 +11876,21 @@
                 <a:gridCol w="2536853">
                   <a:extLst>
                     <a:ext uri="{9D8B030D-6E8A-4147-A177-3AD203B41FA5}">
-                      <a16:colId xmlns:a16="http://schemas.microsoft.com/office/drawing/2014/main" xmlns="" val="20000"/>
+                      <a16:colId xmlns="" xmlns:a16="http://schemas.microsoft.com/office/drawing/2014/main" val="20000"/>
                     </a:ext>
                   </a:extLst>
                 </a:gridCol>
                 <a:gridCol w="3177556">
                   <a:extLst>
                     <a:ext uri="{9D8B030D-6E8A-4147-A177-3AD203B41FA5}">
-                      <a16:colId xmlns:a16="http://schemas.microsoft.com/office/drawing/2014/main" xmlns="" val="20001"/>
+                      <a16:colId xmlns="" xmlns:a16="http://schemas.microsoft.com/office/drawing/2014/main" val="20001"/>
                     </a:ext>
                   </a:extLst>
                 </a:gridCol>
                 <a:gridCol w="4219435">
                   <a:extLst>
                     <a:ext uri="{9D8B030D-6E8A-4147-A177-3AD203B41FA5}">
-                      <a16:colId xmlns:a16="http://schemas.microsoft.com/office/drawing/2014/main" xmlns="" val="20002"/>
+                      <a16:colId xmlns="" xmlns:a16="http://schemas.microsoft.com/office/drawing/2014/main" val="20002"/>
                     </a:ext>
                   </a:extLst>
                 </a:gridCol>
@@ -12020,7 +11976,7 @@
                 </a:tc>
                 <a:extLst>
                   <a:ext uri="{0D108BD9-81ED-4DB2-BD59-A6C34878D82A}">
-                    <a16:rowId xmlns:a16="http://schemas.microsoft.com/office/drawing/2014/main" xmlns="" val="10000"/>
+                    <a16:rowId xmlns="" xmlns:a16="http://schemas.microsoft.com/office/drawing/2014/main" val="10000"/>
                   </a:ext>
                 </a:extLst>
               </a:tr>
@@ -12124,7 +12080,7 @@
                 </a:tc>
                 <a:extLst>
                   <a:ext uri="{0D108BD9-81ED-4DB2-BD59-A6C34878D82A}">
-                    <a16:rowId xmlns:a16="http://schemas.microsoft.com/office/drawing/2014/main" xmlns="" val="10001"/>
+                    <a16:rowId xmlns="" xmlns:a16="http://schemas.microsoft.com/office/drawing/2014/main" val="10001"/>
                   </a:ext>
                 </a:extLst>
               </a:tr>
@@ -12228,7 +12184,7 @@
                 </a:tc>
                 <a:extLst>
                   <a:ext uri="{0D108BD9-81ED-4DB2-BD59-A6C34878D82A}">
-                    <a16:rowId xmlns:a16="http://schemas.microsoft.com/office/drawing/2014/main" xmlns="" val="10002"/>
+                    <a16:rowId xmlns="" xmlns:a16="http://schemas.microsoft.com/office/drawing/2014/main" val="10002"/>
                   </a:ext>
                 </a:extLst>
               </a:tr>
@@ -12332,7 +12288,7 @@
                 </a:tc>
                 <a:extLst>
                   <a:ext uri="{0D108BD9-81ED-4DB2-BD59-A6C34878D82A}">
-                    <a16:rowId xmlns:a16="http://schemas.microsoft.com/office/drawing/2014/main" xmlns="" val="10003"/>
+                    <a16:rowId xmlns="" xmlns:a16="http://schemas.microsoft.com/office/drawing/2014/main" val="10003"/>
                   </a:ext>
                 </a:extLst>
               </a:tr>
@@ -12373,6 +12329,12 @@
                           <a:spcPts val="0"/>
                         </a:spcAft>
                       </a:pPr>
+                      <a:r>
+                        <a:rPr lang="en-US" sz="2000" kern="100" dirty="0" smtClean="0">
+                          <a:effectLst/>
+                        </a:rPr>
+                        <a:t>33E16024</a:t>
+                      </a:r>
                       <a:r>
                         <a:rPr lang="en-US" sz="2000" kern="100" dirty="0">
                           <a:effectLst/>
@@ -12418,7 +12380,7 @@
                 </a:tc>
                 <a:extLst>
                   <a:ext uri="{0D108BD9-81ED-4DB2-BD59-A6C34878D82A}">
-                    <a16:rowId xmlns:a16="http://schemas.microsoft.com/office/drawing/2014/main" xmlns="" val="10004"/>
+                    <a16:rowId xmlns="" xmlns:a16="http://schemas.microsoft.com/office/drawing/2014/main" val="10004"/>
                   </a:ext>
                 </a:extLst>
               </a:tr>
@@ -12516,7 +12478,7 @@
                 </a:tc>
                 <a:extLst>
                   <a:ext uri="{0D108BD9-81ED-4DB2-BD59-A6C34878D82A}">
-                    <a16:rowId xmlns:a16="http://schemas.microsoft.com/office/drawing/2014/main" xmlns="" val="10005"/>
+                    <a16:rowId xmlns="" xmlns:a16="http://schemas.microsoft.com/office/drawing/2014/main" val="10005"/>
                   </a:ext>
                 </a:extLst>
               </a:tr>

</xml_diff>